<commit_message>
relocate files and folders
</commit_message>
<xml_diff>
--- a/Porject management/Reading material/10_AgileProjMgmt_JobAids_v3.0.pptx
+++ b/Porject management/Reading material/10_AgileProjMgmt_JobAids_v3.0.pptx
@@ -24777,7 +24777,7 @@
             <a:fld id="{97DA5CA9-6B25-44A3-86A0-B41E6F5235BC}" type="datetime4">
               <a:rPr lang="en-US" smtClean="0"/>
               <a:pPr/>
-              <a:t>January 14, 2018</a:t>
+              <a:t>September 26, 2018</a:t>
             </a:fld>
             <a:endParaRPr lang="en-US"/>
           </a:p>
@@ -24959,7 +24959,7 @@
             <a:fld id="{F8226336-6458-47E0-BCD3-0C520592AF7A}" type="datetime4">
               <a:rPr lang="en-US" sz="1000" smtClean="0"/>
               <a:pPr/>
-              <a:t>January 14, 2018</a:t>
+              <a:t>September 26, 2018</a:t>
             </a:fld>
             <a:endParaRPr lang="en-US" sz="1000" dirty="0"/>
           </a:p>
@@ -25341,7 +25341,7 @@
             <a:fld id="{2E421AB8-3E80-4E75-B2D3-FA7C607BBAD6}" type="datetime4">
               <a:rPr lang="en-US" sz="1000" smtClean="0"/>
               <a:pPr/>
-              <a:t>January 14, 2018</a:t>
+              <a:t>September 26, 2018</a:t>
             </a:fld>
             <a:endParaRPr lang="en-US" sz="1000" dirty="0"/>
           </a:p>
@@ -25608,7 +25608,7 @@
                 <a:latin typeface="Arial" charset="0"/>
               </a:rPr>
               <a:pPr algn="r" defTabSz="876172"/>
-              <a:t>January 14, 2018</a:t>
+              <a:t>September 26, 2018</a:t>
             </a:fld>
             <a:endParaRPr lang="en-US" sz="1200" dirty="0">
               <a:solidFill>
@@ -25868,7 +25868,7 @@
                 <a:latin typeface="Arial" charset="0"/>
               </a:rPr>
               <a:pPr algn="r" defTabSz="876172"/>
-              <a:t>January 14, 2018</a:t>
+              <a:t>September 26, 2018</a:t>
             </a:fld>
             <a:endParaRPr lang="en-US" sz="1200" dirty="0">
               <a:solidFill>
@@ -26128,7 +26128,7 @@
                 <a:latin typeface="Arial" charset="0"/>
               </a:rPr>
               <a:pPr algn="r" defTabSz="876172"/>
-              <a:t>January 14, 2018</a:t>
+              <a:t>September 26, 2018</a:t>
             </a:fld>
             <a:endParaRPr lang="en-US" sz="1200" dirty="0">
               <a:solidFill>
@@ -26388,7 +26388,7 @@
                 <a:latin typeface="Arial" charset="0"/>
               </a:rPr>
               <a:pPr algn="r" defTabSz="876093"/>
-              <a:t>January 14, 2018</a:t>
+              <a:t>September 26, 2018</a:t>
             </a:fld>
             <a:endParaRPr lang="en-US" sz="1200" dirty="0">
               <a:solidFill>
@@ -26624,7 +26624,7 @@
                 <a:latin typeface="Arial" charset="0"/>
               </a:rPr>
               <a:pPr algn="r" defTabSz="876172"/>
-              <a:t>January 14, 2018</a:t>
+              <a:t>September 26, 2018</a:t>
             </a:fld>
             <a:endParaRPr lang="en-US" sz="1200" dirty="0">
               <a:solidFill>
@@ -26876,7 +26876,7 @@
             <a:fld id="{F8226336-6458-47E0-BCD3-0C520592AF7A}" type="datetime4">
               <a:rPr lang="en-US" sz="1000" smtClean="0"/>
               <a:pPr/>
-              <a:t>January 14, 2018</a:t>
+              <a:t>September 26, 2018</a:t>
             </a:fld>
             <a:endParaRPr lang="en-US" sz="1000" dirty="0"/>
           </a:p>
@@ -27038,7 +27038,7 @@
                 <a:latin typeface="Arial" charset="0"/>
               </a:rPr>
               <a:pPr algn="r" defTabSz="876172"/>
-              <a:t>January 14, 2018</a:t>
+              <a:t>September 26, 2018</a:t>
             </a:fld>
             <a:endParaRPr lang="en-US" sz="1200" dirty="0">
               <a:solidFill>
@@ -27338,7 +27338,7 @@
                 <a:latin typeface="Arial" charset="0"/>
               </a:rPr>
               <a:pPr algn="r" defTabSz="876172"/>
-              <a:t>January 14, 2018</a:t>
+              <a:t>September 26, 2018</a:t>
             </a:fld>
             <a:endParaRPr lang="en-US" sz="1200" dirty="0">
               <a:solidFill>
@@ -27598,7 +27598,7 @@
                 <a:latin typeface="Arial" charset="0"/>
               </a:rPr>
               <a:pPr algn="r" defTabSz="876172"/>
-              <a:t>January 14, 2018</a:t>
+              <a:t>September 26, 2018</a:t>
             </a:fld>
             <a:endParaRPr lang="en-US" sz="1200" dirty="0">
               <a:solidFill>
@@ -27858,7 +27858,7 @@
                 <a:latin typeface="Arial" charset="0"/>
               </a:rPr>
               <a:pPr algn="r" defTabSz="876172"/>
-              <a:t>January 14, 2018</a:t>
+              <a:t>September 26, 2018</a:t>
             </a:fld>
             <a:endParaRPr lang="en-US" sz="1200" dirty="0">
               <a:solidFill>
@@ -28118,7 +28118,7 @@
                 <a:latin typeface="Arial" charset="0"/>
               </a:rPr>
               <a:pPr algn="r" defTabSz="876172"/>
-              <a:t>January 14, 2018</a:t>
+              <a:t>September 26, 2018</a:t>
             </a:fld>
             <a:endParaRPr lang="en-US" sz="1200" dirty="0">
               <a:solidFill>
@@ -28378,7 +28378,7 @@
                 <a:latin typeface="Arial" charset="0"/>
               </a:rPr>
               <a:pPr algn="r" defTabSz="876093"/>
-              <a:t>January 14, 2018</a:t>
+              <a:t>September 26, 2018</a:t>
             </a:fld>
             <a:endParaRPr lang="en-US" sz="1200" dirty="0">
               <a:solidFill>
@@ -28614,7 +28614,7 @@
                 <a:latin typeface="Arial" charset="0"/>
               </a:rPr>
               <a:pPr algn="r" defTabSz="876093"/>
-              <a:t>January 14, 2018</a:t>
+              <a:t>September 26, 2018</a:t>
             </a:fld>
             <a:endParaRPr lang="en-US" sz="1200" dirty="0">
               <a:solidFill>
@@ -32350,16 +32350,7 @@
                 </a:solidFill>
                 <a:latin typeface="Book Antiqua" pitchFamily="18" charset="0"/>
               </a:rPr>
-              <a:t>FACS, </a:t>
-            </a:r>
-            <a:r>
-              <a:rPr lang="en-US" sz="2000" dirty="0" smtClean="0">
-                <a:solidFill>
-                  <a:schemeClr val="tx1"/>
-                </a:solidFill>
-                <a:latin typeface="Book Antiqua" pitchFamily="18" charset="0"/>
-              </a:rPr>
-              <a:t>CBAP</a:t>
+              <a:t>FACS, CBAP</a:t>
             </a:r>
             <a:endParaRPr lang="en-US" sz="3200" dirty="0" smtClean="0">
               <a:solidFill>
@@ -41900,7 +41891,15 @@
             </a:pPr>
             <a:r>
               <a:rPr lang="en-US" sz="1500" dirty="0" smtClean="0"/>
-              <a:t>METRIC: 1-3-5-8-13-20-40; Can apply to Affinity areas; Feedback in Next Iteration</a:t>
+              <a:t>METRIC: </a:t>
+            </a:r>
+            <a:r>
+              <a:rPr lang="en-US" sz="1500" dirty="0" smtClean="0"/>
+              <a:t>1-2-3-5-8-13-20-40</a:t>
+            </a:r>
+            <a:r>
+              <a:rPr lang="en-US" sz="1500" dirty="0" smtClean="0"/>
+              <a:t>; Can apply to Affinity areas; Feedback in Next Iteration</a:t>
             </a:r>
             <a:endParaRPr lang="en-US" sz="1500" b="0" i="0" dirty="0" smtClean="0"/>
           </a:p>

</xml_diff>